<commit_message>
merged class code file. in progress :construction:
</commit_message>
<xml_diff>
--- a/presentation/pptx/05-Unsupervised Learning - Clustering and Outlier Detection.pptx
+++ b/presentation/pptx/05-Unsupervised Learning - Clustering and Outlier Detection.pptx
@@ -5,7 +5,7 @@
     <p:sldMasterId id="2147483840" r:id="rId1"/>
   </p:sldMasterIdLst>
   <p:notesMasterIdLst>
-    <p:notesMasterId r:id="rId37"/>
+    <p:notesMasterId r:id="rId34"/>
   </p:notesMasterIdLst>
   <p:sldIdLst>
     <p:sldId id="256" r:id="rId2"/>
@@ -40,9 +40,6 @@
     <p:sldId id="267" r:id="rId31"/>
     <p:sldId id="325" r:id="rId32"/>
     <p:sldId id="314" r:id="rId33"/>
-    <p:sldId id="316" r:id="rId34"/>
-    <p:sldId id="317" r:id="rId35"/>
-    <p:sldId id="318" r:id="rId36"/>
   </p:sldIdLst>
   <p:sldSz cx="12192000" cy="6858000"/>
   <p:notesSz cx="6858000" cy="9144000"/>
@@ -247,7 +244,7 @@
           <a:p>
             <a:fld id="{5C93CA8F-50F8-44B5-B48F-4C4452AC4FCB}" type="datetimeFigureOut">
               <a:rPr lang="he-IL" smtClean="0"/>
-              <a:t>ט'/אלול/תשע"ט</a:t>
+              <a:t>י"א/אלול/תשע"ט</a:t>
             </a:fld>
             <a:endParaRPr lang="he-IL"/>
           </a:p>
@@ -6540,8 +6537,8 @@
           </a:p>
         </p:txBody>
       </p:sp>
-      <mc:AlternateContent xmlns:mc="http://schemas.openxmlformats.org/markup-compatibility/2006">
-        <mc:Choice xmlns:a14="http://schemas.microsoft.com/office/drawing/2010/main" Requires="a14">
+      <mc:AlternateContent xmlns:mc="http://schemas.openxmlformats.org/markup-compatibility/2006" xmlns:a14="http://schemas.microsoft.com/office/drawing/2010/main">
+        <mc:Choice Requires="a14">
           <p:sp>
             <p:nvSpPr>
               <p:cNvPr id="6" name="Rectangle: Rounded Corners 5">
@@ -6826,7 +6823,7 @@
             </p:txBody>
           </p:sp>
         </mc:Choice>
-        <mc:Fallback>
+        <mc:Fallback xmlns="">
           <p:sp>
             <p:nvSpPr>
               <p:cNvPr id="6" name="Rectangle: Rounded Corners 5">
@@ -6871,8 +6868,8 @@
           </p:sp>
         </mc:Fallback>
       </mc:AlternateContent>
-      <mc:AlternateContent xmlns:mc="http://schemas.openxmlformats.org/markup-compatibility/2006">
-        <mc:Choice xmlns:a14="http://schemas.microsoft.com/office/drawing/2010/main" Requires="a14">
+      <mc:AlternateContent xmlns:mc="http://schemas.openxmlformats.org/markup-compatibility/2006" xmlns:a14="http://schemas.microsoft.com/office/drawing/2010/main">
+        <mc:Choice Requires="a14">
           <p:sp>
             <p:nvSpPr>
               <p:cNvPr id="7" name="Rectangle: Rounded Corners 6">
@@ -6962,7 +6959,7 @@
             </p:txBody>
           </p:sp>
         </mc:Choice>
-        <mc:Fallback>
+        <mc:Fallback xmlns="">
           <p:sp>
             <p:nvSpPr>
               <p:cNvPr id="7" name="Rectangle: Rounded Corners 6">
@@ -7053,8 +7050,8 @@
           </a:fontRef>
         </p:style>
       </p:cxnSp>
-      <mc:AlternateContent xmlns:mc="http://schemas.openxmlformats.org/markup-compatibility/2006">
-        <mc:Choice xmlns:a14="http://schemas.microsoft.com/office/drawing/2010/main" Requires="a14">
+      <mc:AlternateContent xmlns:mc="http://schemas.openxmlformats.org/markup-compatibility/2006" xmlns:a14="http://schemas.microsoft.com/office/drawing/2010/main">
+        <mc:Choice Requires="a14">
           <p:sp>
             <p:nvSpPr>
               <p:cNvPr id="11" name="Rectangle: Rounded Corners 10">
@@ -7144,7 +7141,7 @@
             </p:txBody>
           </p:sp>
         </mc:Choice>
-        <mc:Fallback>
+        <mc:Fallback xmlns="">
           <p:sp>
             <p:nvSpPr>
               <p:cNvPr id="11" name="Rectangle: Rounded Corners 10">
@@ -7235,8 +7232,8 @@
           </a:fontRef>
         </p:style>
       </p:cxnSp>
-      <mc:AlternateContent xmlns:mc="http://schemas.openxmlformats.org/markup-compatibility/2006">
-        <mc:Choice xmlns:a14="http://schemas.microsoft.com/office/drawing/2010/main" Requires="a14">
+      <mc:AlternateContent xmlns:mc="http://schemas.openxmlformats.org/markup-compatibility/2006" xmlns:a14="http://schemas.microsoft.com/office/drawing/2010/main">
+        <mc:Choice Requires="a14">
           <p:sp>
             <p:nvSpPr>
               <p:cNvPr id="19" name="Rectangle: Rounded Corners 18">
@@ -7454,7 +7451,7 @@
             </p:txBody>
           </p:sp>
         </mc:Choice>
-        <mc:Fallback>
+        <mc:Fallback xmlns="">
           <p:sp>
             <p:nvSpPr>
               <p:cNvPr id="19" name="Rectangle: Rounded Corners 18">
@@ -7580,8 +7577,8 @@
           </a:p>
         </p:txBody>
       </p:sp>
-      <mc:AlternateContent xmlns:mc="http://schemas.openxmlformats.org/markup-compatibility/2006">
-        <mc:Choice xmlns:a14="http://schemas.microsoft.com/office/drawing/2010/main" Requires="a14">
+      <mc:AlternateContent xmlns:mc="http://schemas.openxmlformats.org/markup-compatibility/2006" xmlns:a14="http://schemas.microsoft.com/office/drawing/2010/main">
+        <mc:Choice Requires="a14">
           <p:sp>
             <p:nvSpPr>
               <p:cNvPr id="24" name="Rectangle: Rounded Corners 23">
@@ -7878,7 +7875,7 @@
             </p:txBody>
           </p:sp>
         </mc:Choice>
-        <mc:Fallback>
+        <mc:Fallback xmlns="">
           <p:sp>
             <p:nvSpPr>
               <p:cNvPr id="24" name="Rectangle: Rounded Corners 23">
@@ -8166,8 +8163,8 @@
           </a:p>
         </p:txBody>
       </p:sp>
-      <mc:AlternateContent xmlns:mc="http://schemas.openxmlformats.org/markup-compatibility/2006">
-        <mc:Choice xmlns:a14="http://schemas.microsoft.com/office/drawing/2010/main" Requires="a14">
+      <mc:AlternateContent xmlns:mc="http://schemas.openxmlformats.org/markup-compatibility/2006" xmlns:a14="http://schemas.microsoft.com/office/drawing/2010/main">
+        <mc:Choice Requires="a14">
           <p:sp>
             <p:nvSpPr>
               <p:cNvPr id="37" name="Rectangle: Rounded Corners 36">
@@ -8325,7 +8322,7 @@
             </p:txBody>
           </p:sp>
         </mc:Choice>
-        <mc:Fallback>
+        <mc:Fallback xmlns="">
           <p:sp>
             <p:nvSpPr>
               <p:cNvPr id="37" name="Rectangle: Rounded Corners 36">
@@ -8719,8 +8716,8 @@
           <a:chExt cx="0" cy="0"/>
         </a:xfrm>
       </p:grpSpPr>
-      <mc:AlternateContent xmlns:mc="http://schemas.openxmlformats.org/markup-compatibility/2006">
-        <mc:Choice xmlns:a14="http://schemas.microsoft.com/office/drawing/2010/main" Requires="a14">
+      <mc:AlternateContent xmlns:mc="http://schemas.openxmlformats.org/markup-compatibility/2006" xmlns:a14="http://schemas.microsoft.com/office/drawing/2010/main">
+        <mc:Choice Requires="a14">
           <p:sp>
             <p:nvSpPr>
               <p:cNvPr id="2" name="Title 1">
@@ -8794,7 +8791,7 @@
             </p:txBody>
           </p:sp>
         </mc:Choice>
-        <mc:Fallback>
+        <mc:Fallback xmlns="">
           <p:sp>
             <p:nvSpPr>
               <p:cNvPr id="2" name="Title 1">
@@ -8834,8 +8831,8 @@
           </p:sp>
         </mc:Fallback>
       </mc:AlternateContent>
-      <mc:AlternateContent xmlns:mc="http://schemas.openxmlformats.org/markup-compatibility/2006">
-        <mc:Choice xmlns:a14="http://schemas.microsoft.com/office/drawing/2010/main" Requires="a14">
+      <mc:AlternateContent xmlns:mc="http://schemas.openxmlformats.org/markup-compatibility/2006" xmlns:a14="http://schemas.microsoft.com/office/drawing/2010/main">
+        <mc:Choice Requires="a14">
           <p:sp>
             <p:nvSpPr>
               <p:cNvPr id="3" name="Content Placeholder 2">
@@ -9264,7 +9261,7 @@
             </p:txBody>
           </p:sp>
         </mc:Choice>
-        <mc:Fallback>
+        <mc:Fallback xmlns="">
           <p:sp>
             <p:nvSpPr>
               <p:cNvPr id="3" name="Content Placeholder 2">
@@ -9808,8 +9805,8 @@
           </a:fontRef>
         </p:style>
       </p:cxnSp>
-      <mc:AlternateContent xmlns:mc="http://schemas.openxmlformats.org/markup-compatibility/2006">
-        <mc:Choice xmlns:a14="http://schemas.microsoft.com/office/drawing/2010/main" Requires="a14">
+      <mc:AlternateContent xmlns:mc="http://schemas.openxmlformats.org/markup-compatibility/2006" xmlns:a14="http://schemas.microsoft.com/office/drawing/2010/main">
+        <mc:Choice Requires="a14">
           <p:sp>
             <p:nvSpPr>
               <p:cNvPr id="21" name="Rectangle: Rounded Corners 20">
@@ -9930,7 +9927,7 @@
             </p:txBody>
           </p:sp>
         </mc:Choice>
-        <mc:Fallback>
+        <mc:Fallback xmlns="">
           <p:sp>
             <p:nvSpPr>
               <p:cNvPr id="21" name="Rectangle: Rounded Corners 20">
@@ -10294,7 +10291,7 @@
                                         <p:tgtEl>
                                           <p:spTgt spid="3">
                                             <p:txEl>
-                                              <p:charRg st="198" end="228"/>
+                                              <p:pRg st="6" end="6"/>
                                             </p:txEl>
                                           </p:spTgt>
                                         </p:tgtEl>
@@ -10462,8 +10459,8 @@
           </a:p>
         </p:txBody>
       </p:sp>
-      <mc:AlternateContent xmlns:mc="http://schemas.openxmlformats.org/markup-compatibility/2006">
-        <mc:Choice xmlns:a14="http://schemas.microsoft.com/office/drawing/2010/main" Requires="a14">
+      <mc:AlternateContent xmlns:mc="http://schemas.openxmlformats.org/markup-compatibility/2006" xmlns:a14="http://schemas.microsoft.com/office/drawing/2010/main">
+        <mc:Choice Requires="a14">
           <p:sp>
             <p:nvSpPr>
               <p:cNvPr id="3" name="Content Placeholder 2">
@@ -10662,7 +10659,7 @@
             </p:txBody>
           </p:sp>
         </mc:Choice>
-        <mc:Fallback>
+        <mc:Fallback xmlns="">
           <p:sp>
             <p:nvSpPr>
               <p:cNvPr id="3" name="Content Placeholder 2">
@@ -10926,8 +10923,8 @@
           </a:p>
         </p:txBody>
       </p:sp>
-      <mc:AlternateContent xmlns:mc="http://schemas.openxmlformats.org/markup-compatibility/2006">
-        <mc:Choice xmlns:a14="http://schemas.microsoft.com/office/drawing/2010/main" Requires="a14">
+      <mc:AlternateContent xmlns:mc="http://schemas.openxmlformats.org/markup-compatibility/2006" xmlns:a14="http://schemas.microsoft.com/office/drawing/2010/main">
+        <mc:Choice Requires="a14">
           <p:sp>
             <p:nvSpPr>
               <p:cNvPr id="10" name="TextBox 9">
@@ -10956,6 +10953,7 @@
               </a:bodyPr>
               <a:lstStyle/>
               <a:p>
+                <a:pPr/>
                 <a14:m>
                   <m:oMathPara xmlns:m="http://schemas.openxmlformats.org/officeDocument/2006/math">
                     <m:oMathParaPr>
@@ -10990,7 +10988,7 @@
             </p:txBody>
           </p:sp>
         </mc:Choice>
-        <mc:Fallback>
+        <mc:Fallback xmlns="">
           <p:sp>
             <p:nvSpPr>
               <p:cNvPr id="10" name="TextBox 9">
@@ -12155,8 +12153,8 @@
           </a:p>
         </p:txBody>
       </p:sp>
-      <mc:AlternateContent xmlns:mc="http://schemas.openxmlformats.org/markup-compatibility/2006">
-        <mc:Choice xmlns:a14="http://schemas.microsoft.com/office/drawing/2010/main" Requires="a14">
+      <mc:AlternateContent xmlns:mc="http://schemas.openxmlformats.org/markup-compatibility/2006" xmlns:a14="http://schemas.microsoft.com/office/drawing/2010/main">
+        <mc:Choice Requires="a14">
           <p:sp>
             <p:nvSpPr>
               <p:cNvPr id="3" name="Content Placeholder 2">
@@ -12921,7 +12919,7 @@
             </p:txBody>
           </p:sp>
         </mc:Choice>
-        <mc:Fallback>
+        <mc:Fallback xmlns="">
           <p:sp>
             <p:nvSpPr>
               <p:cNvPr id="3" name="Content Placeholder 2">
@@ -13328,8 +13326,8 @@
           </a:fontRef>
         </p:style>
       </p:cxnSp>
-      <mc:AlternateContent xmlns:mc="http://schemas.openxmlformats.org/markup-compatibility/2006">
-        <mc:Choice xmlns:a14="http://schemas.microsoft.com/office/drawing/2010/main" Requires="a14">
+      <mc:AlternateContent xmlns:mc="http://schemas.openxmlformats.org/markup-compatibility/2006" xmlns:a14="http://schemas.microsoft.com/office/drawing/2010/main">
+        <mc:Choice Requires="a14">
           <p:sp>
             <p:nvSpPr>
               <p:cNvPr id="8" name="TextBox 7">
@@ -13567,7 +13565,7 @@
             </p:txBody>
           </p:sp>
         </mc:Choice>
-        <mc:Fallback>
+        <mc:Fallback xmlns="">
           <p:sp>
             <p:nvSpPr>
               <p:cNvPr id="8" name="TextBox 7">
@@ -13821,8 +13819,8 @@
           </a:p>
         </p:txBody>
       </p:sp>
-      <mc:AlternateContent xmlns:mc="http://schemas.openxmlformats.org/markup-compatibility/2006">
-        <mc:Choice xmlns:a14="http://schemas.microsoft.com/office/drawing/2010/main" Requires="a14">
+      <mc:AlternateContent xmlns:mc="http://schemas.openxmlformats.org/markup-compatibility/2006" xmlns:a14="http://schemas.microsoft.com/office/drawing/2010/main">
+        <mc:Choice Requires="a14">
           <p:sp>
             <p:nvSpPr>
               <p:cNvPr id="3" name="Content Placeholder 2">
@@ -14515,7 +14513,7 @@
             </p:txBody>
           </p:sp>
         </mc:Choice>
-        <mc:Fallback>
+        <mc:Fallback xmlns="">
           <p:sp>
             <p:nvSpPr>
               <p:cNvPr id="3" name="Content Placeholder 2">
@@ -14912,8 +14910,8 @@
           </a:p>
         </p:txBody>
       </p:sp>
-      <mc:AlternateContent xmlns:mc="http://schemas.openxmlformats.org/markup-compatibility/2006">
-        <mc:Choice xmlns:a14="http://schemas.microsoft.com/office/drawing/2010/main" Requires="a14">
+      <mc:AlternateContent xmlns:mc="http://schemas.openxmlformats.org/markup-compatibility/2006" xmlns:a14="http://schemas.microsoft.com/office/drawing/2010/main">
+        <mc:Choice Requires="a14">
           <p:sp>
             <p:nvSpPr>
               <p:cNvPr id="29" name="Rectangle: Rounded Corners 28">
@@ -15048,7 +15046,7 @@
             </p:txBody>
           </p:sp>
         </mc:Choice>
-        <mc:Fallback>
+        <mc:Fallback xmlns="">
           <p:sp>
             <p:nvSpPr>
               <p:cNvPr id="29" name="Rectangle: Rounded Corners 28">
@@ -19976,7 +19974,7 @@
             <a:pPr lvl="1"/>
             <a:r>
               <a:rPr lang="en-US" dirty="0"/>
-              <a:t>The average distance (</a:t>
+              <a:t>The average distance (weighted/unweighted </a:t>
             </a:r>
             <a:r>
               <a:rPr lang="en-US" b="1" dirty="0"/>
@@ -19991,7 +19989,15 @@
             <a:pPr lvl="1"/>
             <a:r>
               <a:rPr lang="en-US" dirty="0"/>
-              <a:t>Central mass between clusters (centroid as in the K Means)</a:t>
+              <a:t>Ward (</a:t>
+            </a:r>
+            <a:r>
+              <a:rPr lang="en-US" b="1" dirty="0"/>
+              <a:t>merge clusters which minimize within-cluster variance</a:t>
+            </a:r>
+            <a:r>
+              <a:rPr lang="en-US" dirty="0"/>
+              <a:t>)</a:t>
             </a:r>
           </a:p>
           <a:p>
@@ -20671,8 +20677,8 @@
           </a:p>
         </p:txBody>
       </p:sp>
-      <mc:AlternateContent xmlns:mc="http://schemas.openxmlformats.org/markup-compatibility/2006">
-        <mc:Choice xmlns:a14="http://schemas.microsoft.com/office/drawing/2010/main" Requires="a14">
+      <mc:AlternateContent xmlns:mc="http://schemas.openxmlformats.org/markup-compatibility/2006" xmlns:a14="http://schemas.microsoft.com/office/drawing/2010/main">
+        <mc:Choice Requires="a14">
           <p:sp>
             <p:nvSpPr>
               <p:cNvPr id="3" name="Content Placeholder 2">
@@ -21397,7 +21403,7 @@
             </p:txBody>
           </p:sp>
         </mc:Choice>
-        <mc:Fallback>
+        <mc:Fallback xmlns="">
           <p:sp>
             <p:nvSpPr>
               <p:cNvPr id="3" name="Content Placeholder 2">
@@ -21769,8 +21775,8 @@
           </a:p>
         </p:txBody>
       </p:sp>
-      <mc:AlternateContent xmlns:mc="http://schemas.openxmlformats.org/markup-compatibility/2006">
-        <mc:Choice xmlns:a14="http://schemas.microsoft.com/office/drawing/2010/main" Requires="a14">
+      <mc:AlternateContent xmlns:mc="http://schemas.openxmlformats.org/markup-compatibility/2006" xmlns:a14="http://schemas.microsoft.com/office/drawing/2010/main">
+        <mc:Choice Requires="a14">
           <p:sp>
             <p:nvSpPr>
               <p:cNvPr id="3" name="Content Placeholder 2">
@@ -22999,7 +23005,7 @@
             </p:txBody>
           </p:sp>
         </mc:Choice>
-        <mc:Fallback>
+        <mc:Fallback xmlns="">
           <p:sp>
             <p:nvSpPr>
               <p:cNvPr id="3" name="Content Placeholder 2">
@@ -25057,424 +25063,6 @@
     <p:extLst>
       <p:ext uri="{BB962C8B-B14F-4D97-AF65-F5344CB8AC3E}">
         <p14:creationId xmlns:p14="http://schemas.microsoft.com/office/powerpoint/2010/main" val="314048215"/>
-      </p:ext>
-    </p:extLst>
-  </p:cSld>
-  <p:clrMapOvr>
-    <a:masterClrMapping/>
-  </p:clrMapOvr>
-</p:sld>
-</file>
-
-<file path=ppt/slides/slide33.xml><?xml version="1.0" encoding="utf-8"?>
-<p:sld xmlns:a="http://schemas.openxmlformats.org/drawingml/2006/main" xmlns:r="http://schemas.openxmlformats.org/officeDocument/2006/relationships" xmlns:p="http://schemas.openxmlformats.org/presentationml/2006/main">
-  <p:cSld>
-    <p:spTree>
-      <p:nvGrpSpPr>
-        <p:cNvPr id="1" name=""/>
-        <p:cNvGrpSpPr/>
-        <p:nvPr/>
-      </p:nvGrpSpPr>
-      <p:grpSpPr>
-        <a:xfrm>
-          <a:off x="0" y="0"/>
-          <a:ext cx="0" cy="0"/>
-          <a:chOff x="0" y="0"/>
-          <a:chExt cx="0" cy="0"/>
-        </a:xfrm>
-      </p:grpSpPr>
-      <p:sp>
-        <p:nvSpPr>
-          <p:cNvPr id="2" name="Title 1">
-            <a:extLst>
-              <a:ext uri="{FF2B5EF4-FFF2-40B4-BE49-F238E27FC236}">
-                <a16:creationId xmlns:a16="http://schemas.microsoft.com/office/drawing/2014/main" id="{2EC45849-B9AB-4CE3-B30E-1BEBD35280ED}"/>
-              </a:ext>
-            </a:extLst>
-          </p:cNvPr>
-          <p:cNvSpPr>
-            <a:spLocks noGrp="1"/>
-          </p:cNvSpPr>
-          <p:nvPr>
-            <p:ph type="title"/>
-          </p:nvPr>
-        </p:nvSpPr>
-        <p:spPr/>
-        <p:txBody>
-          <a:bodyPr/>
-          <a:lstStyle/>
-          <a:p>
-            <a:endParaRPr lang="en-IL"/>
-          </a:p>
-        </p:txBody>
-      </p:sp>
-      <p:sp>
-        <p:nvSpPr>
-          <p:cNvPr id="3" name="Content Placeholder 2">
-            <a:extLst>
-              <a:ext uri="{FF2B5EF4-FFF2-40B4-BE49-F238E27FC236}">
-                <a16:creationId xmlns:a16="http://schemas.microsoft.com/office/drawing/2014/main" id="{EE23C921-CD8A-4292-AFE5-9F4F3F85CDFF}"/>
-              </a:ext>
-            </a:extLst>
-          </p:cNvPr>
-          <p:cNvSpPr>
-            <a:spLocks noGrp="1"/>
-          </p:cNvSpPr>
-          <p:nvPr>
-            <p:ph idx="1"/>
-          </p:nvPr>
-        </p:nvSpPr>
-        <p:spPr/>
-        <p:txBody>
-          <a:bodyPr/>
-          <a:lstStyle/>
-          <a:p>
-            <a:endParaRPr lang="en-IL"/>
-          </a:p>
-        </p:txBody>
-      </p:sp>
-      <p:sp>
-        <p:nvSpPr>
-          <p:cNvPr id="4" name="Footer Placeholder 3">
-            <a:extLst>
-              <a:ext uri="{FF2B5EF4-FFF2-40B4-BE49-F238E27FC236}">
-                <a16:creationId xmlns:a16="http://schemas.microsoft.com/office/drawing/2014/main" id="{41898144-80CB-49AA-B99A-1290F155CF9C}"/>
-              </a:ext>
-            </a:extLst>
-          </p:cNvPr>
-          <p:cNvSpPr>
-            <a:spLocks noGrp="1"/>
-          </p:cNvSpPr>
-          <p:nvPr>
-            <p:ph type="ftr" sz="quarter" idx="11"/>
-          </p:nvPr>
-        </p:nvSpPr>
-        <p:spPr/>
-        <p:txBody>
-          <a:bodyPr/>
-          <a:lstStyle/>
-          <a:p>
-            <a:r>
-              <a:rPr lang="en-US"/>
-              <a:t>Materials by Adi Sarid https://adisarid.github.io and http://www.sarid-ins.com</a:t>
-            </a:r>
-            <a:endParaRPr lang="en-US" dirty="0"/>
-          </a:p>
-        </p:txBody>
-      </p:sp>
-      <p:sp>
-        <p:nvSpPr>
-          <p:cNvPr id="5" name="Slide Number Placeholder 4">
-            <a:extLst>
-              <a:ext uri="{FF2B5EF4-FFF2-40B4-BE49-F238E27FC236}">
-                <a16:creationId xmlns:a16="http://schemas.microsoft.com/office/drawing/2014/main" id="{F874F1D2-ADE1-4786-8526-7742F43B4521}"/>
-              </a:ext>
-            </a:extLst>
-          </p:cNvPr>
-          <p:cNvSpPr>
-            <a:spLocks noGrp="1"/>
-          </p:cNvSpPr>
-          <p:nvPr>
-            <p:ph type="sldNum" sz="quarter" idx="12"/>
-          </p:nvPr>
-        </p:nvSpPr>
-        <p:spPr/>
-        <p:txBody>
-          <a:bodyPr/>
-          <a:lstStyle/>
-          <a:p>
-            <a:fld id="{4FAB73BC-B049-4115-A692-8D63A059BFB8}" type="slidenum">
-              <a:rPr lang="en-US" smtClean="0"/>
-              <a:t>33</a:t>
-            </a:fld>
-            <a:endParaRPr lang="en-US" dirty="0"/>
-          </a:p>
-        </p:txBody>
-      </p:sp>
-    </p:spTree>
-    <p:extLst>
-      <p:ext uri="{BB962C8B-B14F-4D97-AF65-F5344CB8AC3E}">
-        <p14:creationId xmlns:p14="http://schemas.microsoft.com/office/powerpoint/2010/main" val="3323912878"/>
-      </p:ext>
-    </p:extLst>
-  </p:cSld>
-  <p:clrMapOvr>
-    <a:masterClrMapping/>
-  </p:clrMapOvr>
-</p:sld>
-</file>
-
-<file path=ppt/slides/slide34.xml><?xml version="1.0" encoding="utf-8"?>
-<p:sld xmlns:a="http://schemas.openxmlformats.org/drawingml/2006/main" xmlns:r="http://schemas.openxmlformats.org/officeDocument/2006/relationships" xmlns:p="http://schemas.openxmlformats.org/presentationml/2006/main">
-  <p:cSld>
-    <p:spTree>
-      <p:nvGrpSpPr>
-        <p:cNvPr id="1" name=""/>
-        <p:cNvGrpSpPr/>
-        <p:nvPr/>
-      </p:nvGrpSpPr>
-      <p:grpSpPr>
-        <a:xfrm>
-          <a:off x="0" y="0"/>
-          <a:ext cx="0" cy="0"/>
-          <a:chOff x="0" y="0"/>
-          <a:chExt cx="0" cy="0"/>
-        </a:xfrm>
-      </p:grpSpPr>
-      <p:sp>
-        <p:nvSpPr>
-          <p:cNvPr id="6" name="Title 5">
-            <a:extLst>
-              <a:ext uri="{FF2B5EF4-FFF2-40B4-BE49-F238E27FC236}">
-                <a16:creationId xmlns:a16="http://schemas.microsoft.com/office/drawing/2014/main" id="{B67B1070-28BC-452C-A15C-EC4278CFED25}"/>
-              </a:ext>
-            </a:extLst>
-          </p:cNvPr>
-          <p:cNvSpPr>
-            <a:spLocks noGrp="1"/>
-          </p:cNvSpPr>
-          <p:nvPr>
-            <p:ph type="title"/>
-          </p:nvPr>
-        </p:nvSpPr>
-        <p:spPr/>
-        <p:txBody>
-          <a:bodyPr/>
-          <a:lstStyle/>
-          <a:p>
-            <a:r>
-              <a:rPr lang="en-US" dirty="0"/>
-              <a:t>False Discovery Rate</a:t>
-            </a:r>
-            <a:endParaRPr lang="en-IL" dirty="0"/>
-          </a:p>
-        </p:txBody>
-      </p:sp>
-      <p:sp>
-        <p:nvSpPr>
-          <p:cNvPr id="7" name="Text Placeholder 6">
-            <a:extLst>
-              <a:ext uri="{FF2B5EF4-FFF2-40B4-BE49-F238E27FC236}">
-                <a16:creationId xmlns:a16="http://schemas.microsoft.com/office/drawing/2014/main" id="{DA657E6E-1ADF-4E17-946A-F73B23133C25}"/>
-              </a:ext>
-            </a:extLst>
-          </p:cNvPr>
-          <p:cNvSpPr>
-            <a:spLocks noGrp="1"/>
-          </p:cNvSpPr>
-          <p:nvPr>
-            <p:ph type="body" idx="1"/>
-          </p:nvPr>
-        </p:nvSpPr>
-        <p:spPr/>
-        <p:txBody>
-          <a:bodyPr/>
-          <a:lstStyle/>
-          <a:p>
-            <a:endParaRPr lang="en-IL"/>
-          </a:p>
-        </p:txBody>
-      </p:sp>
-      <p:sp>
-        <p:nvSpPr>
-          <p:cNvPr id="4" name="Footer Placeholder 3">
-            <a:extLst>
-              <a:ext uri="{FF2B5EF4-FFF2-40B4-BE49-F238E27FC236}">
-                <a16:creationId xmlns:a16="http://schemas.microsoft.com/office/drawing/2014/main" id="{98CB6C87-F49D-4414-A909-8F1804CD45A1}"/>
-              </a:ext>
-            </a:extLst>
-          </p:cNvPr>
-          <p:cNvSpPr>
-            <a:spLocks noGrp="1"/>
-          </p:cNvSpPr>
-          <p:nvPr>
-            <p:ph type="ftr" sz="quarter" idx="11"/>
-          </p:nvPr>
-        </p:nvSpPr>
-        <p:spPr/>
-        <p:txBody>
-          <a:bodyPr/>
-          <a:lstStyle/>
-          <a:p>
-            <a:r>
-              <a:rPr lang="en-US"/>
-              <a:t>Materials by Adi Sarid https://adisarid.github.io and http://www.sarid-ins.com</a:t>
-            </a:r>
-            <a:endParaRPr lang="en-US" dirty="0"/>
-          </a:p>
-        </p:txBody>
-      </p:sp>
-      <p:sp>
-        <p:nvSpPr>
-          <p:cNvPr id="5" name="Slide Number Placeholder 4">
-            <a:extLst>
-              <a:ext uri="{FF2B5EF4-FFF2-40B4-BE49-F238E27FC236}">
-                <a16:creationId xmlns:a16="http://schemas.microsoft.com/office/drawing/2014/main" id="{2977FCDE-526B-41A8-B803-7844D0ED805F}"/>
-              </a:ext>
-            </a:extLst>
-          </p:cNvPr>
-          <p:cNvSpPr>
-            <a:spLocks noGrp="1"/>
-          </p:cNvSpPr>
-          <p:nvPr>
-            <p:ph type="sldNum" sz="quarter" idx="12"/>
-          </p:nvPr>
-        </p:nvSpPr>
-        <p:spPr/>
-        <p:txBody>
-          <a:bodyPr/>
-          <a:lstStyle/>
-          <a:p>
-            <a:fld id="{4FAB73BC-B049-4115-A692-8D63A059BFB8}" type="slidenum">
-              <a:rPr lang="en-US" smtClean="0"/>
-              <a:t>34</a:t>
-            </a:fld>
-            <a:endParaRPr lang="en-US" dirty="0"/>
-          </a:p>
-        </p:txBody>
-      </p:sp>
-    </p:spTree>
-    <p:extLst>
-      <p:ext uri="{BB962C8B-B14F-4D97-AF65-F5344CB8AC3E}">
-        <p14:creationId xmlns:p14="http://schemas.microsoft.com/office/powerpoint/2010/main" val="201577437"/>
-      </p:ext>
-    </p:extLst>
-  </p:cSld>
-  <p:clrMapOvr>
-    <a:masterClrMapping/>
-  </p:clrMapOvr>
-</p:sld>
-</file>
-
-<file path=ppt/slides/slide35.xml><?xml version="1.0" encoding="utf-8"?>
-<p:sld xmlns:a="http://schemas.openxmlformats.org/drawingml/2006/main" xmlns:r="http://schemas.openxmlformats.org/officeDocument/2006/relationships" xmlns:p="http://schemas.openxmlformats.org/presentationml/2006/main">
-  <p:cSld>
-    <p:spTree>
-      <p:nvGrpSpPr>
-        <p:cNvPr id="1" name=""/>
-        <p:cNvGrpSpPr/>
-        <p:nvPr/>
-      </p:nvGrpSpPr>
-      <p:grpSpPr>
-        <a:xfrm>
-          <a:off x="0" y="0"/>
-          <a:ext cx="0" cy="0"/>
-          <a:chOff x="0" y="0"/>
-          <a:chExt cx="0" cy="0"/>
-        </a:xfrm>
-      </p:grpSpPr>
-      <p:sp>
-        <p:nvSpPr>
-          <p:cNvPr id="2" name="Title 1">
-            <a:extLst>
-              <a:ext uri="{FF2B5EF4-FFF2-40B4-BE49-F238E27FC236}">
-                <a16:creationId xmlns:a16="http://schemas.microsoft.com/office/drawing/2014/main" id="{2EC45849-B9AB-4CE3-B30E-1BEBD35280ED}"/>
-              </a:ext>
-            </a:extLst>
-          </p:cNvPr>
-          <p:cNvSpPr>
-            <a:spLocks noGrp="1"/>
-          </p:cNvSpPr>
-          <p:nvPr>
-            <p:ph type="title"/>
-          </p:nvPr>
-        </p:nvSpPr>
-        <p:spPr/>
-        <p:txBody>
-          <a:bodyPr/>
-          <a:lstStyle/>
-          <a:p>
-            <a:endParaRPr lang="en-IL"/>
-          </a:p>
-        </p:txBody>
-      </p:sp>
-      <p:sp>
-        <p:nvSpPr>
-          <p:cNvPr id="3" name="Content Placeholder 2">
-            <a:extLst>
-              <a:ext uri="{FF2B5EF4-FFF2-40B4-BE49-F238E27FC236}">
-                <a16:creationId xmlns:a16="http://schemas.microsoft.com/office/drawing/2014/main" id="{EE23C921-CD8A-4292-AFE5-9F4F3F85CDFF}"/>
-              </a:ext>
-            </a:extLst>
-          </p:cNvPr>
-          <p:cNvSpPr>
-            <a:spLocks noGrp="1"/>
-          </p:cNvSpPr>
-          <p:nvPr>
-            <p:ph idx="1"/>
-          </p:nvPr>
-        </p:nvSpPr>
-        <p:spPr/>
-        <p:txBody>
-          <a:bodyPr/>
-          <a:lstStyle/>
-          <a:p>
-            <a:endParaRPr lang="en-IL"/>
-          </a:p>
-        </p:txBody>
-      </p:sp>
-      <p:sp>
-        <p:nvSpPr>
-          <p:cNvPr id="4" name="Footer Placeholder 3">
-            <a:extLst>
-              <a:ext uri="{FF2B5EF4-FFF2-40B4-BE49-F238E27FC236}">
-                <a16:creationId xmlns:a16="http://schemas.microsoft.com/office/drawing/2014/main" id="{41898144-80CB-49AA-B99A-1290F155CF9C}"/>
-              </a:ext>
-            </a:extLst>
-          </p:cNvPr>
-          <p:cNvSpPr>
-            <a:spLocks noGrp="1"/>
-          </p:cNvSpPr>
-          <p:nvPr>
-            <p:ph type="ftr" sz="quarter" idx="11"/>
-          </p:nvPr>
-        </p:nvSpPr>
-        <p:spPr/>
-        <p:txBody>
-          <a:bodyPr/>
-          <a:lstStyle/>
-          <a:p>
-            <a:r>
-              <a:rPr lang="en-US"/>
-              <a:t>Materials by Adi Sarid https://adisarid.github.io and http://www.sarid-ins.com</a:t>
-            </a:r>
-            <a:endParaRPr lang="en-US" dirty="0"/>
-          </a:p>
-        </p:txBody>
-      </p:sp>
-      <p:sp>
-        <p:nvSpPr>
-          <p:cNvPr id="5" name="Slide Number Placeholder 4">
-            <a:extLst>
-              <a:ext uri="{FF2B5EF4-FFF2-40B4-BE49-F238E27FC236}">
-                <a16:creationId xmlns:a16="http://schemas.microsoft.com/office/drawing/2014/main" id="{F874F1D2-ADE1-4786-8526-7742F43B4521}"/>
-              </a:ext>
-            </a:extLst>
-          </p:cNvPr>
-          <p:cNvSpPr>
-            <a:spLocks noGrp="1"/>
-          </p:cNvSpPr>
-          <p:nvPr>
-            <p:ph type="sldNum" sz="quarter" idx="12"/>
-          </p:nvPr>
-        </p:nvSpPr>
-        <p:spPr/>
-        <p:txBody>
-          <a:bodyPr/>
-          <a:lstStyle/>
-          <a:p>
-            <a:fld id="{4FAB73BC-B049-4115-A692-8D63A059BFB8}" type="slidenum">
-              <a:rPr lang="en-US" smtClean="0"/>
-              <a:t>35</a:t>
-            </a:fld>
-            <a:endParaRPr lang="en-US" dirty="0"/>
-          </a:p>
-        </p:txBody>
-      </p:sp>
-    </p:spTree>
-    <p:extLst>
-      <p:ext uri="{BB962C8B-B14F-4D97-AF65-F5344CB8AC3E}">
-        <p14:creationId xmlns:p14="http://schemas.microsoft.com/office/powerpoint/2010/main" val="4143508479"/>
       </p:ext>
     </p:extLst>
   </p:cSld>

</xml_diff>